<commit_message>
Updated sprint review powerpoint
</commit_message>
<xml_diff>
--- a/Sprint 2/Sprint_Review/Sprint 2 Review.pptx
+++ b/Sprint 2/Sprint_Review/Sprint 2 Review.pptx
@@ -124,7 +124,7 @@
 
 <file path=ppt/commentAuthors.xml><?xml version="1.0" encoding="utf-8"?>
 <p:cmAuthorLst xmlns:a="http://schemas.openxmlformats.org/drawingml/2006/main" xmlns:r="http://schemas.openxmlformats.org/officeDocument/2006/relationships" xmlns:p="http://schemas.openxmlformats.org/presentationml/2006/main">
-  <p:cmAuthor id="1" name="Stewart Scrimgeour (Student)" initials="SS(" lastIdx="2" clrIdx="0">
+  <p:cmAuthor id="1" name="Stewart Scrimgeour (Student)" initials="SS(" lastIdx="3" clrIdx="0">
     <p:extLst>
       <p:ext uri="{19B8F6BF-5375-455C-9EA6-DF929625EA0E}">
         <p15:presenceInfo xmlns:p15="http://schemas.microsoft.com/office/powerpoint/2012/main" userId="Stewart Scrimgeour (Student)" providerId="None"/>
@@ -132,6 +132,20 @@
     </p:extLst>
   </p:cmAuthor>
 </p:cmAuthorLst>
+</file>
+
+<file path=ppt/comments/comment1.xml><?xml version="1.0" encoding="utf-8"?>
+<p:cmLst xmlns:a="http://schemas.openxmlformats.org/drawingml/2006/main" xmlns:r="http://schemas.openxmlformats.org/officeDocument/2006/relationships" xmlns:p="http://schemas.openxmlformats.org/presentationml/2006/main">
+  <p:cm authorId="1" dt="2021-02-05T13:05:14.227" idx="3">
+    <p:pos x="10" y="10"/>
+    <p:text/>
+    <p:extLst>
+      <p:ext uri="{C676402C-5697-4E1C-873F-D02D1690AC5C}">
+        <p15:threadingInfo xmlns:p15="http://schemas.microsoft.com/office/powerpoint/2012/main" timeZoneBias="0"/>
+      </p:ext>
+    </p:extLst>
+  </p:cm>
+</p:cmLst>
 </file>
 
 <file path=ppt/notesMasters/notesMaster1.xml><?xml version="1.0" encoding="utf-8"?>
@@ -860,11 +874,7 @@
           <a:p>
             <a:r>
               <a:rPr lang="en-GB" dirty="0"/>
-              <a:t>Will add burndown </a:t>
-            </a:r>
-            <a:r>
-              <a:rPr lang="en-GB"/>
-              <a:t>chart in here.</a:t>
+              <a:t>Will add burndown chart in here.</a:t>
             </a:r>
           </a:p>
         </p:txBody>
@@ -960,13 +970,14 @@
           <a:p>
             <a:r>
               <a:rPr lang="en-GB" dirty="0"/>
-              <a:t>Can maybe talk about any user stories that weren’t complete if there are </a:t>
-            </a:r>
-            <a:r>
-              <a:rPr lang="en-GB" dirty="0" err="1"/>
-              <a:t>any.S</a:t>
-            </a:r>
-            <a:endParaRPr lang="en-GB" dirty="0"/>
+              <a:t>Can maybe talk about any user stories that weren’t complete if there are any.</a:t>
+            </a:r>
+          </a:p>
+          <a:p>
+            <a:r>
+              <a:rPr lang="en-GB" dirty="0"/>
+              <a:t>Possibly #60</a:t>
+            </a:r>
           </a:p>
         </p:txBody>
       </p:sp>
@@ -7854,7 +7865,7 @@
             <p:ph idx="1"/>
             <p:extLst>
               <p:ext uri="{D42A27DB-BD31-4B8C-83A1-F6EECF244321}">
-                <p14:modId xmlns:p14="http://schemas.microsoft.com/office/powerpoint/2010/main" val="283075196"/>
+                <p14:modId xmlns:p14="http://schemas.microsoft.com/office/powerpoint/2010/main" val="2644219078"/>
               </p:ext>
             </p:extLst>
           </p:nvPr>
@@ -8081,7 +8092,7 @@
                         </a:spcAft>
                       </a:pPr>
                       <a:r>
-                        <a:rPr lang="en-GB" sz="1100">
+                        <a:rPr lang="en-GB" sz="1100" dirty="0">
                           <a:solidFill>
                             <a:srgbClr val="000000"/>
                           </a:solidFill>
@@ -8092,7 +8103,7 @@
                         </a:rPr>
                         <a:t>Items</a:t>
                       </a:r>
-                      <a:endParaRPr lang="en-GB" sz="1100">
+                      <a:endParaRPr lang="en-GB" sz="1100" dirty="0">
                         <a:effectLst/>
                         <a:latin typeface="Calibri" panose="020F0502020204030204" pitchFamily="34" charset="0"/>
                         <a:ea typeface="Calibri" panose="020F0502020204030204" pitchFamily="34" charset="0"/>
@@ -8158,7 +8169,7 @@
                         </a:spcAft>
                       </a:pPr>
                       <a:r>
-                        <a:rPr lang="en-GB" sz="1100" b="1">
+                        <a:rPr lang="en-GB" sz="1100" b="1" dirty="0">
                           <a:effectLst/>
                           <a:latin typeface="Calibri" panose="020F0502020204030204" pitchFamily="34" charset="0"/>
                           <a:ea typeface="Calibri" panose="020F0502020204030204" pitchFamily="34" charset="0"/>
@@ -8166,7 +8177,7 @@
                         </a:rPr>
                         <a:t>9</a:t>
                       </a:r>
-                      <a:endParaRPr lang="en-GB" sz="1100">
+                      <a:endParaRPr lang="en-GB" sz="1100" dirty="0">
                         <a:effectLst/>
                         <a:latin typeface="Calibri" panose="020F0502020204030204" pitchFamily="34" charset="0"/>
                         <a:ea typeface="Calibri" panose="020F0502020204030204" pitchFamily="34" charset="0"/>
@@ -8254,13 +8265,22 @@
                         </a:spcAft>
                       </a:pPr>
                       <a:r>
+                        <a:rPr lang="en-GB" sz="1100" b="1">
+                          <a:effectLst/>
+                          <a:latin typeface="Calibri" panose="020F0502020204030204" pitchFamily="34" charset="0"/>
+                          <a:ea typeface="Calibri" panose="020F0502020204030204" pitchFamily="34" charset="0"/>
+                          <a:cs typeface="Times New Roman" panose="02020603050405020304" pitchFamily="18" charset="0"/>
+                        </a:rPr>
+                        <a:t>4</a:t>
+                      </a:r>
+                      <a:r>
                         <a:rPr lang="en-GB" sz="1100" b="1" dirty="0">
                           <a:effectLst/>
                           <a:latin typeface="Calibri" panose="020F0502020204030204" pitchFamily="34" charset="0"/>
                           <a:ea typeface="Calibri" panose="020F0502020204030204" pitchFamily="34" charset="0"/>
                           <a:cs typeface="Times New Roman" panose="02020603050405020304" pitchFamily="18" charset="0"/>
                         </a:rPr>
-                        <a:t>?</a:t>
+                        <a:t>0</a:t>
                       </a:r>
                       <a:endParaRPr lang="en-GB" sz="1100" dirty="0">
                         <a:effectLst/>
@@ -8549,29 +8569,99 @@
       </p:sp>
       <p:sp>
         <p:nvSpPr>
-          <p:cNvPr id="3" name="Content Placeholder 2">
+          <p:cNvPr id="6" name="TextBox 5">
             <a:extLst>
               <a:ext uri="{FF2B5EF4-FFF2-40B4-BE49-F238E27FC236}">
-                <a16:creationId xmlns:a16="http://schemas.microsoft.com/office/drawing/2014/main" id="{C3855901-B4FC-45CA-8409-5D0FF312238C}"/>
+                <a16:creationId xmlns:a16="http://schemas.microsoft.com/office/drawing/2014/main" id="{8E4FB15A-BA7D-4EC3-83F3-55570D7EA175}"/>
               </a:ext>
             </a:extLst>
           </p:cNvPr>
-          <p:cNvSpPr>
-            <a:spLocks noGrp="1"/>
-          </p:cNvSpPr>
-          <p:nvPr>
-            <p:ph idx="1"/>
-          </p:nvPr>
-        </p:nvSpPr>
-        <p:spPr/>
-        <p:txBody>
-          <a:bodyPr/>
+          <p:cNvSpPr txBox="1"/>
+          <p:nvPr/>
+        </p:nvSpPr>
+        <p:spPr>
+          <a:xfrm>
+            <a:off x="6616786" y="3244334"/>
+            <a:ext cx="914400" cy="369332"/>
+          </a:xfrm>
+          <a:prstGeom prst="rect">
+            <a:avLst/>
+          </a:prstGeom>
+          <a:noFill/>
+        </p:spPr>
+        <p:txBody>
+          <a:bodyPr wrap="square" rtlCol="0">
+            <a:spAutoFit/>
+          </a:bodyPr>
           <a:lstStyle/>
           <a:p>
-            <a:endParaRPr lang="en-GB" dirty="0"/>
-          </a:p>
-        </p:txBody>
-      </p:sp>
+            <a:r>
+              <a:rPr lang="en-GB" dirty="0"/>
+              <a:t>VS</a:t>
+            </a:r>
+          </a:p>
+        </p:txBody>
+      </p:sp>
+      <p:pic>
+        <p:nvPicPr>
+          <p:cNvPr id="10" name="Picture 9">
+            <a:extLst>
+              <a:ext uri="{FF2B5EF4-FFF2-40B4-BE49-F238E27FC236}">
+                <a16:creationId xmlns:a16="http://schemas.microsoft.com/office/drawing/2014/main" id="{20A4E4AF-D9CF-4C10-8F41-AED4D4973D8A}"/>
+              </a:ext>
+            </a:extLst>
+          </p:cNvPr>
+          <p:cNvPicPr>
+            <a:picLocks noChangeAspect="1"/>
+          </p:cNvPicPr>
+          <p:nvPr/>
+        </p:nvPicPr>
+        <p:blipFill>
+          <a:blip r:embed="rId3"/>
+          <a:stretch>
+            <a:fillRect/>
+          </a:stretch>
+        </p:blipFill>
+        <p:spPr>
+          <a:xfrm>
+            <a:off x="7942214" y="1857375"/>
+            <a:ext cx="3895725" cy="3581400"/>
+          </a:xfrm>
+          <a:prstGeom prst="rect">
+            <a:avLst/>
+          </a:prstGeom>
+        </p:spPr>
+      </p:pic>
+      <p:pic>
+        <p:nvPicPr>
+          <p:cNvPr id="11" name="Picture 10">
+            <a:extLst>
+              <a:ext uri="{FF2B5EF4-FFF2-40B4-BE49-F238E27FC236}">
+                <a16:creationId xmlns:a16="http://schemas.microsoft.com/office/drawing/2014/main" id="{9BD35A6D-93B0-44F8-81C8-07E2EB041155}"/>
+              </a:ext>
+            </a:extLst>
+          </p:cNvPr>
+          <p:cNvPicPr>
+            <a:picLocks noChangeAspect="1"/>
+          </p:cNvPicPr>
+          <p:nvPr/>
+        </p:nvPicPr>
+        <p:blipFill>
+          <a:blip r:embed="rId4"/>
+          <a:stretch>
+            <a:fillRect/>
+          </a:stretch>
+        </p:blipFill>
+        <p:spPr>
+          <a:xfrm>
+            <a:off x="1169156" y="1866900"/>
+            <a:ext cx="4406060" cy="3571875"/>
+          </a:xfrm>
+          <a:prstGeom prst="rect">
+            <a:avLst/>
+          </a:prstGeom>
+        </p:spPr>
+      </p:pic>
     </p:spTree>
     <p:extLst>
       <p:ext uri="{BB962C8B-B14F-4D97-AF65-F5344CB8AC3E}">
@@ -8716,7 +8806,7 @@
           <a:p>
             <a:r>
               <a:rPr lang="en-GB" dirty="0"/>
-              <a:t>Overall visualisation of the product being improved (e.g. University Branding)</a:t>
+              <a:t>Overall visualisation of the product being improved (e.g. Data Visualisation and University Branding)</a:t>
             </a:r>
           </a:p>
           <a:p>

</xml_diff>